<commit_message>
Modal fonctionnel Manque @lang
</commit_message>
<xml_diff>
--- a/Documentation/SchemaAssignation.pptx
+++ b/Documentation/SchemaAssignation.pptx
@@ -266,7 +266,7 @@
           <a:p>
             <a:fld id="{A2B27590-D842-4E1D-A11D-F3E5246461CF}" type="datetimeFigureOut">
               <a:rPr lang="fr-CA" smtClean="0"/>
-              <a:t>2020-05-05</a:t>
+              <a:t>2020-05-06</a:t>
             </a:fld>
             <a:endParaRPr lang="fr-CA"/>
           </a:p>
@@ -466,7 +466,7 @@
           <a:p>
             <a:fld id="{A2B27590-D842-4E1D-A11D-F3E5246461CF}" type="datetimeFigureOut">
               <a:rPr lang="fr-CA" smtClean="0"/>
-              <a:t>2020-05-05</a:t>
+              <a:t>2020-05-06</a:t>
             </a:fld>
             <a:endParaRPr lang="fr-CA"/>
           </a:p>
@@ -676,7 +676,7 @@
           <a:p>
             <a:fld id="{A2B27590-D842-4E1D-A11D-F3E5246461CF}" type="datetimeFigureOut">
               <a:rPr lang="fr-CA" smtClean="0"/>
-              <a:t>2020-05-05</a:t>
+              <a:t>2020-05-06</a:t>
             </a:fld>
             <a:endParaRPr lang="fr-CA"/>
           </a:p>
@@ -876,7 +876,7 @@
           <a:p>
             <a:fld id="{A2B27590-D842-4E1D-A11D-F3E5246461CF}" type="datetimeFigureOut">
               <a:rPr lang="fr-CA" smtClean="0"/>
-              <a:t>2020-05-05</a:t>
+              <a:t>2020-05-06</a:t>
             </a:fld>
             <a:endParaRPr lang="fr-CA"/>
           </a:p>
@@ -1152,7 +1152,7 @@
           <a:p>
             <a:fld id="{A2B27590-D842-4E1D-A11D-F3E5246461CF}" type="datetimeFigureOut">
               <a:rPr lang="fr-CA" smtClean="0"/>
-              <a:t>2020-05-05</a:t>
+              <a:t>2020-05-06</a:t>
             </a:fld>
             <a:endParaRPr lang="fr-CA"/>
           </a:p>
@@ -1420,7 +1420,7 @@
           <a:p>
             <a:fld id="{A2B27590-D842-4E1D-A11D-F3E5246461CF}" type="datetimeFigureOut">
               <a:rPr lang="fr-CA" smtClean="0"/>
-              <a:t>2020-05-05</a:t>
+              <a:t>2020-05-06</a:t>
             </a:fld>
             <a:endParaRPr lang="fr-CA"/>
           </a:p>
@@ -1835,7 +1835,7 @@
           <a:p>
             <a:fld id="{A2B27590-D842-4E1D-A11D-F3E5246461CF}" type="datetimeFigureOut">
               <a:rPr lang="fr-CA" smtClean="0"/>
-              <a:t>2020-05-05</a:t>
+              <a:t>2020-05-06</a:t>
             </a:fld>
             <a:endParaRPr lang="fr-CA"/>
           </a:p>
@@ -1977,7 +1977,7 @@
           <a:p>
             <a:fld id="{A2B27590-D842-4E1D-A11D-F3E5246461CF}" type="datetimeFigureOut">
               <a:rPr lang="fr-CA" smtClean="0"/>
-              <a:t>2020-05-05</a:t>
+              <a:t>2020-05-06</a:t>
             </a:fld>
             <a:endParaRPr lang="fr-CA"/>
           </a:p>
@@ -2090,7 +2090,7 @@
           <a:p>
             <a:fld id="{A2B27590-D842-4E1D-A11D-F3E5246461CF}" type="datetimeFigureOut">
               <a:rPr lang="fr-CA" smtClean="0"/>
-              <a:t>2020-05-05</a:t>
+              <a:t>2020-05-06</a:t>
             </a:fld>
             <a:endParaRPr lang="fr-CA"/>
           </a:p>
@@ -2403,7 +2403,7 @@
           <a:p>
             <a:fld id="{A2B27590-D842-4E1D-A11D-F3E5246461CF}" type="datetimeFigureOut">
               <a:rPr lang="fr-CA" smtClean="0"/>
-              <a:t>2020-05-05</a:t>
+              <a:t>2020-05-06</a:t>
             </a:fld>
             <a:endParaRPr lang="fr-CA"/>
           </a:p>
@@ -2692,7 +2692,7 @@
           <a:p>
             <a:fld id="{A2B27590-D842-4E1D-A11D-F3E5246461CF}" type="datetimeFigureOut">
               <a:rPr lang="fr-CA" smtClean="0"/>
-              <a:t>2020-05-05</a:t>
+              <a:t>2020-05-06</a:t>
             </a:fld>
             <a:endParaRPr lang="fr-CA"/>
           </a:p>
@@ -2935,7 +2935,7 @@
           <a:p>
             <a:fld id="{A2B27590-D842-4E1D-A11D-F3E5246461CF}" type="datetimeFigureOut">
               <a:rPr lang="fr-CA" smtClean="0"/>
-              <a:t>2020-05-05</a:t>
+              <a:t>2020-05-06</a:t>
             </a:fld>
             <a:endParaRPr lang="fr-CA"/>
           </a:p>
@@ -9688,13 +9688,68 @@
           </a:prstGeom>
         </p:spPr>
       </p:pic>
+      <p:sp>
+        <p:nvSpPr>
+          <p:cNvPr id="10" name="Rectangle 9">
+            <a:extLst>
+              <a:ext uri="{FF2B5EF4-FFF2-40B4-BE49-F238E27FC236}">
+                <a16:creationId xmlns:a16="http://schemas.microsoft.com/office/drawing/2014/main" id="{29D9F795-4518-4DAE-920E-46AFB3655354}"/>
+              </a:ext>
+            </a:extLst>
+          </p:cNvPr>
+          <p:cNvSpPr/>
+          <p:nvPr/>
+        </p:nvSpPr>
+        <p:spPr>
+          <a:xfrm>
+            <a:off x="7581547" y="2187956"/>
+            <a:ext cx="4061084" cy="960794"/>
+          </a:xfrm>
+          <a:prstGeom prst="rect">
+            <a:avLst/>
+          </a:prstGeom>
+          <a:solidFill>
+            <a:schemeClr val="bg1"/>
+          </a:solidFill>
+          <a:ln>
+            <a:solidFill>
+              <a:schemeClr val="bg1">
+                <a:lumMod val="85000"/>
+              </a:schemeClr>
+            </a:solidFill>
+          </a:ln>
+        </p:spPr>
+        <p:style>
+          <a:lnRef idx="2">
+            <a:schemeClr val="accent1">
+              <a:shade val="50000"/>
+            </a:schemeClr>
+          </a:lnRef>
+          <a:fillRef idx="1">
+            <a:schemeClr val="accent1"/>
+          </a:fillRef>
+          <a:effectRef idx="0">
+            <a:schemeClr val="accent1"/>
+          </a:effectRef>
+          <a:fontRef idx="minor">
+            <a:schemeClr val="lt1"/>
+          </a:fontRef>
+        </p:style>
+        <p:txBody>
+          <a:bodyPr rtlCol="0" anchor="ctr"/>
+          <a:lstStyle/>
+          <a:p>
+            <a:pPr algn="ctr"/>
+            <a:endParaRPr lang="fr-CA"/>
+          </a:p>
+        </p:txBody>
+      </p:sp>
       <p:cxnSp>
         <p:nvCxnSpPr>
           <p:cNvPr id="45" name="Connecteur droit avec flèche 44"/>
           <p:cNvCxnSpPr>
             <a:cxnSpLocks/>
             <a:stCxn id="9" idx="3"/>
-            <a:endCxn id="85" idx="3"/>
           </p:cNvCxnSpPr>
           <p:nvPr>
             <p:custDataLst>
@@ -9704,12 +9759,13 @@
         </p:nvCxnSpPr>
         <p:spPr>
           <a:xfrm flipH="1">
-            <a:off x="8191004" y="676379"/>
-            <a:ext cx="108348" cy="1719362"/>
-          </a:xfrm>
-          <a:prstGeom prst="curvedConnector3">
+            <a:off x="8036308" y="676379"/>
+            <a:ext cx="263044" cy="2513186"/>
+          </a:xfrm>
+          <a:prstGeom prst="curvedConnector4">
             <a:avLst>
-              <a:gd name="adj1" fmla="val -210987"/>
+              <a:gd name="adj1" fmla="val -86906"/>
+              <a:gd name="adj2" fmla="val 58266"/>
             </a:avLst>
           </a:prstGeom>
           <a:ln>

</xml_diff>